<commit_message>
Tugas tanggal 22-10-2020 (DONE)
</commit_message>
<xml_diff>
--- a/Week 1/22-10-2020/pptx/22-10-2020.pptx
+++ b/Week 1/22-10-2020/pptx/22-10-2020.pptx
@@ -117,6 +117,11 @@
       </a:defRPr>
     </a:lvl9pPr>
   </p:defaultTextStyle>
+  <p:extLst>
+    <p:ext uri="{EFAFB233-063F-42B5-8137-9DF3F51BA10A}">
+      <p15:sldGuideLst xmlns:p15="http://schemas.microsoft.com/office/powerpoint/2012/main"/>
+    </p:ext>
+  </p:extLst>
 </p:presentation>
 </file>
 
@@ -4912,37 +4917,35 @@
       </p:grpSpPr>
       <p:sp>
         <p:nvSpPr>
-          <p:cNvPr id="6" name="TextBox 5">
+          <p:cNvPr id="3" name="Title 19">
             <a:extLst>
               <a:ext uri="{FF2B5EF4-FFF2-40B4-BE49-F238E27FC236}">
-                <a16:creationId xmlns:a16="http://schemas.microsoft.com/office/drawing/2014/main" id="{4EEEE005-4C9F-406F-AE3D-9A0A21B23344}"/>
+                <a16:creationId xmlns:a16="http://schemas.microsoft.com/office/drawing/2014/main" id="{D6D4DAFB-BEF8-41F8-B319-9925259352E1}"/>
               </a:ext>
             </a:extLst>
           </p:cNvPr>
-          <p:cNvSpPr txBox="1"/>
-          <p:nvPr/>
+          <p:cNvSpPr>
+            <a:spLocks noGrp="1"/>
+          </p:cNvSpPr>
+          <p:nvPr>
+            <p:ph type="ctrTitle"/>
+          </p:nvPr>
         </p:nvSpPr>
         <p:spPr>
           <a:xfrm>
-            <a:off x="2866602" y="2835414"/>
-            <a:ext cx="7077579" cy="707886"/>
+            <a:off x="1840727" y="2112793"/>
+            <a:ext cx="6798250" cy="1674470"/>
           </a:xfrm>
-          <a:prstGeom prst="rect">
-            <a:avLst/>
-          </a:prstGeom>
-          <a:noFill/>
         </p:spPr>
         <p:txBody>
-          <a:bodyPr wrap="none" rtlCol="0" anchor="ctr">
-            <a:spAutoFit/>
-          </a:bodyPr>
-          <a:lstStyle/>
-          <a:p>
-            <a:r>
-              <a:rPr lang="en-ID" sz="4000" b="1" dirty="0">
+          <a:bodyPr/>
+          <a:lstStyle/>
+          <a:p>
+            <a:r>
+              <a:rPr lang="en-US" dirty="0">
                 <a:latin typeface="Arial (Headings)"/>
               </a:rPr>
-              <a:t>SEKIAN DAN TERIMAKASIH</a:t>
+              <a:t>THANK YOU</a:t>
             </a:r>
           </a:p>
         </p:txBody>

</xml_diff>